<commit_message>
swapping logging slides in slides13 so that simple appears before complex.
</commit_message>
<xml_diff>
--- a/python/presentations/learning_python/13_ceda-log-pdb.pptx
+++ b/python/presentations/learning_python/13_ceda-log-pdb.pptx
@@ -8,8 +8,8 @@
     <p:sldId id="266" r:id="rId2"/>
     <p:sldId id="257" r:id="rId3"/>
     <p:sldId id="258" r:id="rId4"/>
-    <p:sldId id="259" r:id="rId5"/>
-    <p:sldId id="260" r:id="rId6"/>
+    <p:sldId id="260" r:id="rId5"/>
+    <p:sldId id="259" r:id="rId6"/>
     <p:sldId id="261" r:id="rId7"/>
     <p:sldId id="262" r:id="rId8"/>
     <p:sldId id="263" r:id="rId9"/>
@@ -693,7 +693,7 @@
               <a:pPr>
                 <a:defRPr/>
               </a:pPr>
-              <a:t>17/11/2021</a:t>
+              <a:t>26/11/2021</a:t>
             </a:fld>
             <a:endParaRPr lang="en-GB"/>
           </a:p>
@@ -930,7 +930,7 @@
               <a:pPr>
                 <a:defRPr/>
               </a:pPr>
-              <a:t>17/11/2021</a:t>
+              <a:t>26/11/2021</a:t>
             </a:fld>
             <a:endParaRPr lang="en-GB"/>
           </a:p>
@@ -1651,7 +1651,7 @@
               <a:pPr>
                 <a:defRPr/>
               </a:pPr>
-              <a:t>17/11/2021</a:t>
+              <a:t>26/11/2021</a:t>
             </a:fld>
             <a:endParaRPr lang="en-GB"/>
           </a:p>
@@ -4460,6 +4460,665 @@
       </p:grpSpPr>
       <p:sp>
         <p:nvSpPr>
+          <p:cNvPr id="13314" name="Title 1"/>
+          <p:cNvSpPr>
+            <a:spLocks noGrp="1"/>
+          </p:cNvSpPr>
+          <p:nvPr>
+            <p:ph type="title"/>
+          </p:nvPr>
+        </p:nvSpPr>
+        <p:spPr/>
+        <p:txBody>
+          <a:bodyPr/>
+          <a:lstStyle/>
+          <a:p>
+            <a:pPr eaLnBrk="1" hangingPunct="1"/>
+            <a:r>
+              <a:rPr lang="en-GB" altLang="en-US" b="1" dirty="0"/>
+              <a:t>Logging – getting started</a:t>
+            </a:r>
+          </a:p>
+        </p:txBody>
+      </p:sp>
+      <p:sp>
+        <p:nvSpPr>
+          <p:cNvPr id="3" name="Content Placeholder 2"/>
+          <p:cNvSpPr>
+            <a:spLocks noGrp="1"/>
+          </p:cNvSpPr>
+          <p:nvPr>
+            <p:ph idx="1"/>
+          </p:nvPr>
+        </p:nvSpPr>
+        <p:spPr/>
+        <p:txBody>
+          <a:bodyPr rtlCol="0">
+            <a:normAutofit fontScale="92500" lnSpcReduction="10000"/>
+          </a:bodyPr>
+          <a:lstStyle/>
+          <a:p>
+            <a:pPr eaLnBrk="1" fontAlgn="auto" hangingPunct="1">
+              <a:spcAft>
+                <a:spcPts val="0"/>
+              </a:spcAft>
+              <a:buFont typeface="Arial" panose="020B0604020202020204" pitchFamily="34" charset="0"/>
+              <a:buNone/>
+              <a:defRPr/>
+            </a:pPr>
+            <a:r>
+              <a:rPr lang="en-GB" sz="2400" b="1" dirty="0">
+                <a:latin typeface="Courier New" panose="02070309020205020404" pitchFamily="49" charset="0"/>
+                <a:cs typeface="Courier New" panose="02070309020205020404" pitchFamily="49" charset="0"/>
+              </a:rPr>
+              <a:t>&gt;&gt;&gt;</a:t>
+            </a:r>
+            <a:r>
+              <a:rPr lang="en-GB" sz="2400" dirty="0">
+                <a:latin typeface="Courier New" panose="02070309020205020404" pitchFamily="49" charset="0"/>
+                <a:cs typeface="Courier New" panose="02070309020205020404" pitchFamily="49" charset="0"/>
+              </a:rPr>
+              <a:t> </a:t>
+            </a:r>
+            <a:r>
+              <a:rPr lang="en-GB" sz="2400" b="1" dirty="0">
+                <a:latin typeface="Courier New" panose="02070309020205020404" pitchFamily="49" charset="0"/>
+                <a:cs typeface="Courier New" panose="02070309020205020404" pitchFamily="49" charset="0"/>
+              </a:rPr>
+              <a:t>import</a:t>
+            </a:r>
+            <a:r>
+              <a:rPr lang="en-GB" sz="2400" dirty="0">
+                <a:latin typeface="Courier New" panose="02070309020205020404" pitchFamily="49" charset="0"/>
+                <a:cs typeface="Courier New" panose="02070309020205020404" pitchFamily="49" charset="0"/>
+              </a:rPr>
+              <a:t> logging</a:t>
+            </a:r>
+          </a:p>
+          <a:p>
+            <a:pPr eaLnBrk="1" fontAlgn="auto" hangingPunct="1">
+              <a:spcAft>
+                <a:spcPts val="0"/>
+              </a:spcAft>
+              <a:buFont typeface="Arial" panose="020B0604020202020204" pitchFamily="34" charset="0"/>
+              <a:buNone/>
+              <a:defRPr/>
+            </a:pPr>
+            <a:r>
+              <a:rPr lang="en-GB" sz="2400" b="1" dirty="0">
+                <a:latin typeface="Courier New" panose="02070309020205020404" pitchFamily="49" charset="0"/>
+                <a:cs typeface="Courier New" panose="02070309020205020404" pitchFamily="49" charset="0"/>
+              </a:rPr>
+              <a:t>&gt;&gt;&gt;</a:t>
+            </a:r>
+            <a:r>
+              <a:rPr lang="en-GB" sz="2400" dirty="0">
+                <a:latin typeface="Courier New" panose="02070309020205020404" pitchFamily="49" charset="0"/>
+                <a:cs typeface="Courier New" panose="02070309020205020404" pitchFamily="49" charset="0"/>
+              </a:rPr>
+              <a:t> </a:t>
+            </a:r>
+            <a:r>
+              <a:rPr lang="en-GB" sz="2400" dirty="0" err="1">
+                <a:latin typeface="Courier New" panose="02070309020205020404" pitchFamily="49" charset="0"/>
+                <a:cs typeface="Courier New" panose="02070309020205020404" pitchFamily="49" charset="0"/>
+              </a:rPr>
+              <a:t>logging.basicConfig</a:t>
+            </a:r>
+            <a:r>
+              <a:rPr lang="en-GB" sz="2400" dirty="0">
+                <a:latin typeface="Courier New" panose="02070309020205020404" pitchFamily="49" charset="0"/>
+                <a:cs typeface="Courier New" panose="02070309020205020404" pitchFamily="49" charset="0"/>
+              </a:rPr>
+              <a:t>(level=</a:t>
+            </a:r>
+            <a:r>
+              <a:rPr lang="en-GB" sz="2400" dirty="0" err="1">
+                <a:latin typeface="Courier New" panose="02070309020205020404" pitchFamily="49" charset="0"/>
+                <a:cs typeface="Courier New" panose="02070309020205020404" pitchFamily="49" charset="0"/>
+              </a:rPr>
+              <a:t>logging.INFO</a:t>
+            </a:r>
+            <a:r>
+              <a:rPr lang="en-GB" sz="2400" dirty="0">
+                <a:latin typeface="Courier New" panose="02070309020205020404" pitchFamily="49" charset="0"/>
+                <a:cs typeface="Courier New" panose="02070309020205020404" pitchFamily="49" charset="0"/>
+              </a:rPr>
+              <a:t>)</a:t>
+            </a:r>
+          </a:p>
+          <a:p>
+            <a:pPr eaLnBrk="1" fontAlgn="auto" hangingPunct="1">
+              <a:spcAft>
+                <a:spcPts val="0"/>
+              </a:spcAft>
+              <a:buFont typeface="Arial" panose="020B0604020202020204" pitchFamily="34" charset="0"/>
+              <a:buNone/>
+              <a:defRPr/>
+            </a:pPr>
+            <a:r>
+              <a:rPr lang="en-GB" sz="2400" b="1" dirty="0">
+                <a:latin typeface="Courier New" panose="02070309020205020404" pitchFamily="49" charset="0"/>
+                <a:cs typeface="Courier New" panose="02070309020205020404" pitchFamily="49" charset="0"/>
+              </a:rPr>
+              <a:t>&gt;&gt;&gt;</a:t>
+            </a:r>
+            <a:r>
+              <a:rPr lang="en-GB" sz="2400" dirty="0">
+                <a:latin typeface="Courier New" panose="02070309020205020404" pitchFamily="49" charset="0"/>
+                <a:cs typeface="Courier New" panose="02070309020205020404" pitchFamily="49" charset="0"/>
+              </a:rPr>
+              <a:t> log = </a:t>
+            </a:r>
+            <a:r>
+              <a:rPr lang="en-GB" sz="2400" dirty="0" err="1">
+                <a:latin typeface="Courier New" panose="02070309020205020404" pitchFamily="49" charset="0"/>
+                <a:cs typeface="Courier New" panose="02070309020205020404" pitchFamily="49" charset="0"/>
+              </a:rPr>
+              <a:t>logging.getLogger</a:t>
+            </a:r>
+            <a:r>
+              <a:rPr lang="en-GB" sz="2400" dirty="0">
+                <a:latin typeface="Courier New" panose="02070309020205020404" pitchFamily="49" charset="0"/>
+                <a:cs typeface="Courier New" panose="02070309020205020404" pitchFamily="49" charset="0"/>
+              </a:rPr>
+              <a:t>(__name__)</a:t>
+            </a:r>
+          </a:p>
+          <a:p>
+            <a:pPr eaLnBrk="1" fontAlgn="auto" hangingPunct="1">
+              <a:spcAft>
+                <a:spcPts val="0"/>
+              </a:spcAft>
+              <a:buFont typeface="Arial" panose="020B0604020202020204" pitchFamily="34" charset="0"/>
+              <a:buNone/>
+              <a:defRPr/>
+            </a:pPr>
+            <a:r>
+              <a:rPr lang="en-GB" sz="2400" b="1" dirty="0">
+                <a:latin typeface="Courier New" panose="02070309020205020404" pitchFamily="49" charset="0"/>
+                <a:cs typeface="Courier New" panose="02070309020205020404" pitchFamily="49" charset="0"/>
+              </a:rPr>
+              <a:t>&gt;&gt;&gt;</a:t>
+            </a:r>
+            <a:r>
+              <a:rPr lang="en-GB" sz="2400" dirty="0">
+                <a:latin typeface="Courier New" panose="02070309020205020404" pitchFamily="49" charset="0"/>
+                <a:cs typeface="Courier New" panose="02070309020205020404" pitchFamily="49" charset="0"/>
+              </a:rPr>
+              <a:t> log.info("The system is running")</a:t>
+            </a:r>
+          </a:p>
+          <a:p>
+            <a:pPr eaLnBrk="1" fontAlgn="auto" hangingPunct="1">
+              <a:spcAft>
+                <a:spcPts val="0"/>
+              </a:spcAft>
+              <a:buFont typeface="Arial" panose="020B0604020202020204" pitchFamily="34" charset="0"/>
+              <a:buNone/>
+              <a:defRPr/>
+            </a:pPr>
+            <a:r>
+              <a:rPr lang="en-GB" sz="2400" b="1" dirty="0" err="1">
+                <a:solidFill>
+                  <a:srgbClr val="FF0000"/>
+                </a:solidFill>
+                <a:latin typeface="Courier New" panose="02070309020205020404" pitchFamily="49" charset="0"/>
+                <a:cs typeface="Courier New" panose="02070309020205020404" pitchFamily="49" charset="0"/>
+              </a:rPr>
+              <a:t>INFO:root:The</a:t>
+            </a:r>
+            <a:r>
+              <a:rPr lang="en-GB" sz="2400" b="1" dirty="0">
+                <a:solidFill>
+                  <a:srgbClr val="FF0000"/>
+                </a:solidFill>
+                <a:latin typeface="Courier New" panose="02070309020205020404" pitchFamily="49" charset="0"/>
+                <a:cs typeface="Courier New" panose="02070309020205020404" pitchFamily="49" charset="0"/>
+              </a:rPr>
+              <a:t> system is running.</a:t>
+            </a:r>
+          </a:p>
+          <a:p>
+            <a:pPr eaLnBrk="1" fontAlgn="auto" hangingPunct="1">
+              <a:spcAft>
+                <a:spcPts val="0"/>
+              </a:spcAft>
+              <a:buFont typeface="Arial" panose="020B0604020202020204" pitchFamily="34" charset="0"/>
+              <a:buNone/>
+              <a:defRPr/>
+            </a:pPr>
+            <a:endParaRPr lang="en-GB" sz="2400" b="1" dirty="0">
+              <a:solidFill>
+                <a:srgbClr val="002060"/>
+              </a:solidFill>
+              <a:latin typeface="Courier New" panose="02070309020205020404" pitchFamily="49" charset="0"/>
+              <a:cs typeface="Courier New" panose="02070309020205020404" pitchFamily="49" charset="0"/>
+            </a:endParaRPr>
+          </a:p>
+          <a:p>
+            <a:pPr marL="4029075" indent="-4029075" eaLnBrk="1" fontAlgn="auto" hangingPunct="1">
+              <a:spcAft>
+                <a:spcPts val="0"/>
+              </a:spcAft>
+              <a:buFont typeface="Arial" panose="020B0604020202020204" pitchFamily="34" charset="0"/>
+              <a:buNone/>
+              <a:defRPr/>
+            </a:pPr>
+            <a:r>
+              <a:rPr lang="en-GB" sz="2400" b="1" dirty="0">
+                <a:latin typeface="Courier New" panose="02070309020205020404" pitchFamily="49" charset="0"/>
+                <a:cs typeface="Courier New" panose="02070309020205020404" pitchFamily="49" charset="0"/>
+              </a:rPr>
+              <a:t>&gt;&gt;&gt;</a:t>
+            </a:r>
+            <a:r>
+              <a:rPr lang="en-GB" sz="2400" dirty="0">
+                <a:latin typeface="Courier New" panose="02070309020205020404" pitchFamily="49" charset="0"/>
+                <a:cs typeface="Courier New" panose="02070309020205020404" pitchFamily="49" charset="0"/>
+              </a:rPr>
+              <a:t> </a:t>
+            </a:r>
+            <a:r>
+              <a:rPr lang="en-GB" sz="2400" dirty="0" err="1">
+                <a:latin typeface="Courier New" panose="02070309020205020404" pitchFamily="49" charset="0"/>
+                <a:cs typeface="Courier New" panose="02070309020205020404" pitchFamily="49" charset="0"/>
+              </a:rPr>
+              <a:t>log.debug</a:t>
+            </a:r>
+            <a:r>
+              <a:rPr lang="en-GB" sz="2400" dirty="0">
+                <a:latin typeface="Courier New" panose="02070309020205020404" pitchFamily="49" charset="0"/>
+                <a:cs typeface="Courier New" panose="02070309020205020404" pitchFamily="49" charset="0"/>
+              </a:rPr>
+              <a:t>("Nothing said") </a:t>
+            </a:r>
+            <a:r>
+              <a:rPr lang="en-GB" sz="2400" dirty="0">
+                <a:solidFill>
+                  <a:srgbClr val="FFC000"/>
+                </a:solidFill>
+                <a:latin typeface="Courier New" panose="02070309020205020404" pitchFamily="49" charset="0"/>
+                <a:cs typeface="Courier New" panose="02070309020205020404" pitchFamily="49" charset="0"/>
+              </a:rPr>
+              <a:t># Not displayed </a:t>
+            </a:r>
+          </a:p>
+          <a:p>
+            <a:pPr marL="4029075" indent="-4029075" eaLnBrk="1" fontAlgn="auto" hangingPunct="1">
+              <a:spcAft>
+                <a:spcPts val="0"/>
+              </a:spcAft>
+              <a:buFont typeface="Arial" panose="020B0604020202020204" pitchFamily="34" charset="0"/>
+              <a:buNone/>
+              <a:defRPr/>
+            </a:pPr>
+            <a:r>
+              <a:rPr lang="en-GB" sz="2400" dirty="0">
+                <a:solidFill>
+                  <a:srgbClr val="FFC000"/>
+                </a:solidFill>
+                <a:latin typeface="Courier New" panose="02070309020205020404" pitchFamily="49" charset="0"/>
+                <a:cs typeface="Courier New" panose="02070309020205020404" pitchFamily="49" charset="0"/>
+              </a:rPr>
+              <a:t>           because logging at lower than</a:t>
+            </a:r>
+          </a:p>
+          <a:p>
+            <a:pPr marL="4029075" indent="-4029075" eaLnBrk="1" fontAlgn="auto" hangingPunct="1">
+              <a:spcAft>
+                <a:spcPts val="0"/>
+              </a:spcAft>
+              <a:buFont typeface="Arial" panose="020B0604020202020204" pitchFamily="34" charset="0"/>
+              <a:buNone/>
+              <a:defRPr/>
+            </a:pPr>
+            <a:r>
+              <a:rPr lang="en-GB" sz="2400" dirty="0">
+                <a:solidFill>
+                  <a:srgbClr val="FFC000"/>
+                </a:solidFill>
+                <a:latin typeface="Courier New" panose="02070309020205020404" pitchFamily="49" charset="0"/>
+                <a:cs typeface="Courier New" panose="02070309020205020404" pitchFamily="49" charset="0"/>
+              </a:rPr>
+              <a:t>           priority level</a:t>
+            </a:r>
+          </a:p>
+          <a:p>
+            <a:pPr marL="4029075" indent="-4029075" eaLnBrk="1" fontAlgn="auto" hangingPunct="1">
+              <a:spcAft>
+                <a:spcPts val="0"/>
+              </a:spcAft>
+              <a:buFont typeface="Arial" panose="020B0604020202020204" pitchFamily="34" charset="0"/>
+              <a:buNone/>
+              <a:defRPr/>
+            </a:pPr>
+            <a:r>
+              <a:rPr lang="en-GB" sz="2400" b="1" dirty="0">
+                <a:latin typeface="Courier New" panose="02070309020205020404" pitchFamily="49" charset="0"/>
+                <a:cs typeface="Courier New" panose="02070309020205020404" pitchFamily="49" charset="0"/>
+              </a:rPr>
+              <a:t>&gt;&gt;&gt;</a:t>
+            </a:r>
+            <a:r>
+              <a:rPr lang="en-GB" sz="2400" dirty="0">
+                <a:latin typeface="Courier New" panose="02070309020205020404" pitchFamily="49" charset="0"/>
+                <a:cs typeface="Courier New" panose="02070309020205020404" pitchFamily="49" charset="0"/>
+              </a:rPr>
+              <a:t> </a:t>
+            </a:r>
+            <a:r>
+              <a:rPr lang="en-GB" sz="2400" dirty="0" err="1">
+                <a:latin typeface="Courier New" panose="02070309020205020404" pitchFamily="49" charset="0"/>
+                <a:cs typeface="Courier New" panose="02070309020205020404" pitchFamily="49" charset="0"/>
+              </a:rPr>
+              <a:t>log.error</a:t>
+            </a:r>
+            <a:r>
+              <a:rPr lang="en-GB" sz="2400" dirty="0">
+                <a:latin typeface="Courier New" panose="02070309020205020404" pitchFamily="49" charset="0"/>
+                <a:cs typeface="Courier New" panose="02070309020205020404" pitchFamily="49" charset="0"/>
+              </a:rPr>
+              <a:t>("Now it's serious!")</a:t>
+            </a:r>
+            <a:endParaRPr lang="en-GB" sz="2400" b="1" dirty="0">
+              <a:solidFill>
+                <a:srgbClr val="00B050"/>
+              </a:solidFill>
+              <a:latin typeface="Courier New" panose="02070309020205020404" pitchFamily="49" charset="0"/>
+              <a:cs typeface="Courier New" panose="02070309020205020404" pitchFamily="49" charset="0"/>
+            </a:endParaRPr>
+          </a:p>
+          <a:p>
+            <a:pPr marL="4029075" indent="-4029075" eaLnBrk="1" fontAlgn="auto" hangingPunct="1">
+              <a:spcAft>
+                <a:spcPts val="0"/>
+              </a:spcAft>
+              <a:buFont typeface="Arial" panose="020B0604020202020204" pitchFamily="34" charset="0"/>
+              <a:buNone/>
+              <a:defRPr/>
+            </a:pPr>
+            <a:r>
+              <a:rPr lang="en-GB" sz="2400" b="1" dirty="0">
+                <a:solidFill>
+                  <a:srgbClr val="FF0000"/>
+                </a:solidFill>
+                <a:latin typeface="Courier New" panose="02070309020205020404" pitchFamily="49" charset="0"/>
+                <a:cs typeface="Courier New" panose="02070309020205020404" pitchFamily="49" charset="0"/>
+              </a:rPr>
+              <a:t>ERROR:&lt;</a:t>
+            </a:r>
+            <a:r>
+              <a:rPr lang="en-GB" sz="2400" b="1" dirty="0" err="1">
+                <a:solidFill>
+                  <a:srgbClr val="FF0000"/>
+                </a:solidFill>
+                <a:latin typeface="Courier New" panose="02070309020205020404" pitchFamily="49" charset="0"/>
+                <a:cs typeface="Courier New" panose="02070309020205020404" pitchFamily="49" charset="0"/>
+              </a:rPr>
+              <a:t>module_name</a:t>
+            </a:r>
+            <a:r>
+              <a:rPr lang="en-GB" sz="2400" b="1" dirty="0">
+                <a:solidFill>
+                  <a:srgbClr val="FF0000"/>
+                </a:solidFill>
+                <a:latin typeface="Courier New" panose="02070309020205020404" pitchFamily="49" charset="0"/>
+                <a:cs typeface="Courier New" panose="02070309020205020404" pitchFamily="49" charset="0"/>
+              </a:rPr>
+              <a:t>&gt;:Now it's serious!</a:t>
+            </a:r>
+          </a:p>
+        </p:txBody>
+      </p:sp>
+    </p:spTree>
+  </p:cSld>
+  <p:clrMapOvr>
+    <a:masterClrMapping/>
+  </p:clrMapOvr>
+  <p:timing>
+    <p:tnLst>
+      <p:par>
+        <p:cTn id="1" dur="indefinite" restart="never" nodeType="tmRoot">
+          <p:childTnLst>
+            <p:seq concurrent="1" nextAc="seek">
+              <p:cTn id="2" dur="indefinite" nodeType="mainSeq">
+                <p:childTnLst>
+                  <p:par>
+                    <p:cTn id="3" fill="hold" nodeType="clickPar">
+                      <p:stCondLst>
+                        <p:cond delay="indefinite"/>
+                      </p:stCondLst>
+                      <p:childTnLst>
+                        <p:par>
+                          <p:cTn id="4" fill="hold" nodeType="withGroup">
+                            <p:stCondLst>
+                              <p:cond delay="0"/>
+                            </p:stCondLst>
+                            <p:childTnLst>
+                              <p:par>
+                                <p:cTn id="5" presetID="1" presetClass="entr" presetSubtype="0" fill="hold" nodeType="clickEffect">
+                                  <p:stCondLst>
+                                    <p:cond delay="0"/>
+                                  </p:stCondLst>
+                                  <p:childTnLst>
+                                    <p:set>
+                                      <p:cBhvr>
+                                        <p:cTn id="6" dur="1" fill="hold">
+                                          <p:stCondLst>
+                                            <p:cond delay="0"/>
+                                          </p:stCondLst>
+                                        </p:cTn>
+                                        <p:tgtEl>
+                                          <p:spTgt spid="3">
+                                            <p:txEl>
+                                              <p:pRg st="6" end="6"/>
+                                            </p:txEl>
+                                          </p:spTgt>
+                                        </p:tgtEl>
+                                        <p:attrNameLst>
+                                          <p:attrName>style.visibility</p:attrName>
+                                        </p:attrNameLst>
+                                      </p:cBhvr>
+                                      <p:to>
+                                        <p:strVal val="visible"/>
+                                      </p:to>
+                                    </p:set>
+                                  </p:childTnLst>
+                                </p:cTn>
+                              </p:par>
+                              <p:par>
+                                <p:cTn id="7" presetID="1" presetClass="entr" presetSubtype="0" fill="hold" nodeType="withEffect">
+                                  <p:stCondLst>
+                                    <p:cond delay="0"/>
+                                  </p:stCondLst>
+                                  <p:childTnLst>
+                                    <p:set>
+                                      <p:cBhvr>
+                                        <p:cTn id="8" dur="1" fill="hold">
+                                          <p:stCondLst>
+                                            <p:cond delay="0"/>
+                                          </p:stCondLst>
+                                        </p:cTn>
+                                        <p:tgtEl>
+                                          <p:spTgt spid="3">
+                                            <p:txEl>
+                                              <p:pRg st="7" end="7"/>
+                                            </p:txEl>
+                                          </p:spTgt>
+                                        </p:tgtEl>
+                                        <p:attrNameLst>
+                                          <p:attrName>style.visibility</p:attrName>
+                                        </p:attrNameLst>
+                                      </p:cBhvr>
+                                      <p:to>
+                                        <p:strVal val="visible"/>
+                                      </p:to>
+                                    </p:set>
+                                  </p:childTnLst>
+                                </p:cTn>
+                              </p:par>
+                              <p:par>
+                                <p:cTn id="9" presetID="1" presetClass="entr" presetSubtype="0" fill="hold" nodeType="withEffect">
+                                  <p:stCondLst>
+                                    <p:cond delay="0"/>
+                                  </p:stCondLst>
+                                  <p:childTnLst>
+                                    <p:set>
+                                      <p:cBhvr>
+                                        <p:cTn id="10" dur="1" fill="hold">
+                                          <p:stCondLst>
+                                            <p:cond delay="0"/>
+                                          </p:stCondLst>
+                                        </p:cTn>
+                                        <p:tgtEl>
+                                          <p:spTgt spid="3">
+                                            <p:txEl>
+                                              <p:pRg st="8" end="8"/>
+                                            </p:txEl>
+                                          </p:spTgt>
+                                        </p:tgtEl>
+                                        <p:attrNameLst>
+                                          <p:attrName>style.visibility</p:attrName>
+                                        </p:attrNameLst>
+                                      </p:cBhvr>
+                                      <p:to>
+                                        <p:strVal val="visible"/>
+                                      </p:to>
+                                    </p:set>
+                                  </p:childTnLst>
+                                </p:cTn>
+                              </p:par>
+                            </p:childTnLst>
+                          </p:cTn>
+                        </p:par>
+                      </p:childTnLst>
+                    </p:cTn>
+                  </p:par>
+                  <p:par>
+                    <p:cTn id="11" fill="hold" nodeType="clickPar">
+                      <p:stCondLst>
+                        <p:cond delay="indefinite"/>
+                      </p:stCondLst>
+                      <p:childTnLst>
+                        <p:par>
+                          <p:cTn id="12" fill="hold" nodeType="withGroup">
+                            <p:stCondLst>
+                              <p:cond delay="0"/>
+                            </p:stCondLst>
+                            <p:childTnLst>
+                              <p:par>
+                                <p:cTn id="13" presetID="1" presetClass="entr" presetSubtype="0" fill="hold" nodeType="clickEffect">
+                                  <p:stCondLst>
+                                    <p:cond delay="0"/>
+                                  </p:stCondLst>
+                                  <p:childTnLst>
+                                    <p:set>
+                                      <p:cBhvr>
+                                        <p:cTn id="14" dur="1" fill="hold">
+                                          <p:stCondLst>
+                                            <p:cond delay="0"/>
+                                          </p:stCondLst>
+                                        </p:cTn>
+                                        <p:tgtEl>
+                                          <p:spTgt spid="3">
+                                            <p:txEl>
+                                              <p:pRg st="9" end="9"/>
+                                            </p:txEl>
+                                          </p:spTgt>
+                                        </p:tgtEl>
+                                        <p:attrNameLst>
+                                          <p:attrName>style.visibility</p:attrName>
+                                        </p:attrNameLst>
+                                      </p:cBhvr>
+                                      <p:to>
+                                        <p:strVal val="visible"/>
+                                      </p:to>
+                                    </p:set>
+                                  </p:childTnLst>
+                                </p:cTn>
+                              </p:par>
+                              <p:par>
+                                <p:cTn id="15" presetID="1" presetClass="entr" presetSubtype="0" fill="hold" nodeType="withEffect">
+                                  <p:stCondLst>
+                                    <p:cond delay="0"/>
+                                  </p:stCondLst>
+                                  <p:childTnLst>
+                                    <p:set>
+                                      <p:cBhvr>
+                                        <p:cTn id="16" dur="1" fill="hold">
+                                          <p:stCondLst>
+                                            <p:cond delay="0"/>
+                                          </p:stCondLst>
+                                        </p:cTn>
+                                        <p:tgtEl>
+                                          <p:spTgt spid="3">
+                                            <p:txEl>
+                                              <p:pRg st="10" end="10"/>
+                                            </p:txEl>
+                                          </p:spTgt>
+                                        </p:tgtEl>
+                                        <p:attrNameLst>
+                                          <p:attrName>style.visibility</p:attrName>
+                                        </p:attrNameLst>
+                                      </p:cBhvr>
+                                      <p:to>
+                                        <p:strVal val="visible"/>
+                                      </p:to>
+                                    </p:set>
+                                  </p:childTnLst>
+                                </p:cTn>
+                              </p:par>
+                            </p:childTnLst>
+                          </p:cTn>
+                        </p:par>
+                      </p:childTnLst>
+                    </p:cTn>
+                  </p:par>
+                </p:childTnLst>
+              </p:cTn>
+              <p:prevCondLst>
+                <p:cond evt="onPrev" delay="0">
+                  <p:tgtEl>
+                    <p:sldTgt/>
+                  </p:tgtEl>
+                </p:cond>
+              </p:prevCondLst>
+              <p:nextCondLst>
+                <p:cond evt="onNext" delay="0">
+                  <p:tgtEl>
+                    <p:sldTgt/>
+                  </p:tgtEl>
+                </p:cond>
+              </p:nextCondLst>
+            </p:seq>
+          </p:childTnLst>
+        </p:cTn>
+      </p:par>
+    </p:tnLst>
+  </p:timing>
+</p:sld>
+</file>
+
+<file path=ppt/slides/slide5.xml><?xml version="1.0" encoding="utf-8"?>
+<p:sld xmlns:a="http://schemas.openxmlformats.org/drawingml/2006/main" xmlns:r="http://schemas.openxmlformats.org/officeDocument/2006/relationships" xmlns:p="http://schemas.openxmlformats.org/presentationml/2006/main">
+  <p:cSld>
+    <p:spTree>
+      <p:nvGrpSpPr>
+        <p:cNvPr id="1" name=""/>
+        <p:cNvGrpSpPr/>
+        <p:nvPr/>
+      </p:nvGrpSpPr>
+      <p:grpSpPr>
+        <a:xfrm>
+          <a:off x="0" y="0"/>
+          <a:ext cx="0" cy="0"/>
+          <a:chOff x="0" y="0"/>
+          <a:chExt cx="0" cy="0"/>
+        </a:xfrm>
+      </p:grpSpPr>
+      <p:sp>
+        <p:nvSpPr>
           <p:cNvPr id="12290" name="Title 1"/>
           <p:cNvSpPr>
             <a:spLocks noGrp="1"/>
@@ -4475,8 +5134,8 @@
           <a:p>
             <a:pPr eaLnBrk="1" hangingPunct="1"/>
             <a:r>
-              <a:rPr lang="en-GB" altLang="en-US" b="1"/>
-              <a:t>Alas, no time</a:t>
+              <a:rPr lang="en-GB" altLang="en-US" b="1" dirty="0"/>
+              <a:t>Logging – more options</a:t>
             </a:r>
           </a:p>
         </p:txBody>
@@ -4499,7 +5158,7 @@
         </p:spPr>
         <p:txBody>
           <a:bodyPr rtlCol="0">
-            <a:normAutofit fontScale="70000" lnSpcReduction="20000"/>
+            <a:normAutofit fontScale="62500" lnSpcReduction="20000"/>
           </a:bodyPr>
           <a:lstStyle/>
           <a:p>
@@ -4507,13 +5166,22 @@
               <a:spcAft>
                 <a:spcPts val="0"/>
               </a:spcAft>
-              <a:buFont typeface="Arial" panose="020B0604020202020204" pitchFamily="34" charset="0"/>
               <a:buNone/>
               <a:defRPr/>
             </a:pPr>
             <a:r>
               <a:rPr lang="en-GB" sz="4000" dirty="0"/>
-              <a:t>We do not have time to cover logging properly. This could get you started:</a:t>
+              <a:t>We do not have time to cover logging properly. There are lots you can do with it: </a:t>
+            </a:r>
+            <a:r>
+              <a:rPr lang="en-GB" sz="4000" dirty="0">
+                <a:hlinkClick r:id="rId2"/>
+              </a:rPr>
+              <a:t>https://docs.python.org/3/library/logging.html</a:t>
+            </a:r>
+            <a:r>
+              <a:rPr lang="en-GB" sz="4000" dirty="0"/>
+              <a:t> </a:t>
             </a:r>
           </a:p>
           <a:p>
@@ -5185,665 +5853,6 @@
                                           <p:spTgt spid="3">
                                             <p:txEl>
                                               <p:pRg st="12" end="12"/>
-                                            </p:txEl>
-                                          </p:spTgt>
-                                        </p:tgtEl>
-                                        <p:attrNameLst>
-                                          <p:attrName>style.visibility</p:attrName>
-                                        </p:attrNameLst>
-                                      </p:cBhvr>
-                                      <p:to>
-                                        <p:strVal val="visible"/>
-                                      </p:to>
-                                    </p:set>
-                                  </p:childTnLst>
-                                </p:cTn>
-                              </p:par>
-                            </p:childTnLst>
-                          </p:cTn>
-                        </p:par>
-                      </p:childTnLst>
-                    </p:cTn>
-                  </p:par>
-                </p:childTnLst>
-              </p:cTn>
-              <p:prevCondLst>
-                <p:cond evt="onPrev" delay="0">
-                  <p:tgtEl>
-                    <p:sldTgt/>
-                  </p:tgtEl>
-                </p:cond>
-              </p:prevCondLst>
-              <p:nextCondLst>
-                <p:cond evt="onNext" delay="0">
-                  <p:tgtEl>
-                    <p:sldTgt/>
-                  </p:tgtEl>
-                </p:cond>
-              </p:nextCondLst>
-            </p:seq>
-          </p:childTnLst>
-        </p:cTn>
-      </p:par>
-    </p:tnLst>
-  </p:timing>
-</p:sld>
-</file>
-
-<file path=ppt/slides/slide5.xml><?xml version="1.0" encoding="utf-8"?>
-<p:sld xmlns:a="http://schemas.openxmlformats.org/drawingml/2006/main" xmlns:r="http://schemas.openxmlformats.org/officeDocument/2006/relationships" xmlns:p="http://schemas.openxmlformats.org/presentationml/2006/main">
-  <p:cSld>
-    <p:spTree>
-      <p:nvGrpSpPr>
-        <p:cNvPr id="1" name=""/>
-        <p:cNvGrpSpPr/>
-        <p:nvPr/>
-      </p:nvGrpSpPr>
-      <p:grpSpPr>
-        <a:xfrm>
-          <a:off x="0" y="0"/>
-          <a:ext cx="0" cy="0"/>
-          <a:chOff x="0" y="0"/>
-          <a:chExt cx="0" cy="0"/>
-        </a:xfrm>
-      </p:grpSpPr>
-      <p:sp>
-        <p:nvSpPr>
-          <p:cNvPr id="13314" name="Title 1"/>
-          <p:cNvSpPr>
-            <a:spLocks noGrp="1"/>
-          </p:cNvSpPr>
-          <p:nvPr>
-            <p:ph type="title"/>
-          </p:nvPr>
-        </p:nvSpPr>
-        <p:spPr/>
-        <p:txBody>
-          <a:bodyPr/>
-          <a:lstStyle/>
-          <a:p>
-            <a:pPr eaLnBrk="1" hangingPunct="1"/>
-            <a:r>
-              <a:rPr lang="en-GB" altLang="en-US" b="1" dirty="0"/>
-              <a:t>Or, the shortened version</a:t>
-            </a:r>
-          </a:p>
-        </p:txBody>
-      </p:sp>
-      <p:sp>
-        <p:nvSpPr>
-          <p:cNvPr id="3" name="Content Placeholder 2"/>
-          <p:cNvSpPr>
-            <a:spLocks noGrp="1"/>
-          </p:cNvSpPr>
-          <p:nvPr>
-            <p:ph idx="1"/>
-          </p:nvPr>
-        </p:nvSpPr>
-        <p:spPr/>
-        <p:txBody>
-          <a:bodyPr rtlCol="0">
-            <a:normAutofit fontScale="92500" lnSpcReduction="10000"/>
-          </a:bodyPr>
-          <a:lstStyle/>
-          <a:p>
-            <a:pPr eaLnBrk="1" fontAlgn="auto" hangingPunct="1">
-              <a:spcAft>
-                <a:spcPts val="0"/>
-              </a:spcAft>
-              <a:buFont typeface="Arial" panose="020B0604020202020204" pitchFamily="34" charset="0"/>
-              <a:buNone/>
-              <a:defRPr/>
-            </a:pPr>
-            <a:r>
-              <a:rPr lang="en-GB" sz="2400" b="1" dirty="0">
-                <a:latin typeface="Courier New" panose="02070309020205020404" pitchFamily="49" charset="0"/>
-                <a:cs typeface="Courier New" panose="02070309020205020404" pitchFamily="49" charset="0"/>
-              </a:rPr>
-              <a:t>&gt;&gt;&gt;</a:t>
-            </a:r>
-            <a:r>
-              <a:rPr lang="en-GB" sz="2400" dirty="0">
-                <a:latin typeface="Courier New" panose="02070309020205020404" pitchFamily="49" charset="0"/>
-                <a:cs typeface="Courier New" panose="02070309020205020404" pitchFamily="49" charset="0"/>
-              </a:rPr>
-              <a:t> </a:t>
-            </a:r>
-            <a:r>
-              <a:rPr lang="en-GB" sz="2400" b="1" dirty="0">
-                <a:latin typeface="Courier New" panose="02070309020205020404" pitchFamily="49" charset="0"/>
-                <a:cs typeface="Courier New" panose="02070309020205020404" pitchFamily="49" charset="0"/>
-              </a:rPr>
-              <a:t>import</a:t>
-            </a:r>
-            <a:r>
-              <a:rPr lang="en-GB" sz="2400" dirty="0">
-                <a:latin typeface="Courier New" panose="02070309020205020404" pitchFamily="49" charset="0"/>
-                <a:cs typeface="Courier New" panose="02070309020205020404" pitchFamily="49" charset="0"/>
-              </a:rPr>
-              <a:t> logging</a:t>
-            </a:r>
-          </a:p>
-          <a:p>
-            <a:pPr eaLnBrk="1" fontAlgn="auto" hangingPunct="1">
-              <a:spcAft>
-                <a:spcPts val="0"/>
-              </a:spcAft>
-              <a:buFont typeface="Arial" panose="020B0604020202020204" pitchFamily="34" charset="0"/>
-              <a:buNone/>
-              <a:defRPr/>
-            </a:pPr>
-            <a:r>
-              <a:rPr lang="en-GB" sz="2400" b="1" dirty="0">
-                <a:latin typeface="Courier New" panose="02070309020205020404" pitchFamily="49" charset="0"/>
-                <a:cs typeface="Courier New" panose="02070309020205020404" pitchFamily="49" charset="0"/>
-              </a:rPr>
-              <a:t>&gt;&gt;&gt;</a:t>
-            </a:r>
-            <a:r>
-              <a:rPr lang="en-GB" sz="2400" dirty="0">
-                <a:latin typeface="Courier New" panose="02070309020205020404" pitchFamily="49" charset="0"/>
-                <a:cs typeface="Courier New" panose="02070309020205020404" pitchFamily="49" charset="0"/>
-              </a:rPr>
-              <a:t> </a:t>
-            </a:r>
-            <a:r>
-              <a:rPr lang="en-GB" sz="2400" dirty="0" err="1">
-                <a:latin typeface="Courier New" panose="02070309020205020404" pitchFamily="49" charset="0"/>
-                <a:cs typeface="Courier New" panose="02070309020205020404" pitchFamily="49" charset="0"/>
-              </a:rPr>
-              <a:t>logging.basicConfig</a:t>
-            </a:r>
-            <a:r>
-              <a:rPr lang="en-GB" sz="2400" dirty="0">
-                <a:latin typeface="Courier New" panose="02070309020205020404" pitchFamily="49" charset="0"/>
-                <a:cs typeface="Courier New" panose="02070309020205020404" pitchFamily="49" charset="0"/>
-              </a:rPr>
-              <a:t>(level=</a:t>
-            </a:r>
-            <a:r>
-              <a:rPr lang="en-GB" sz="2400" dirty="0" err="1">
-                <a:latin typeface="Courier New" panose="02070309020205020404" pitchFamily="49" charset="0"/>
-                <a:cs typeface="Courier New" panose="02070309020205020404" pitchFamily="49" charset="0"/>
-              </a:rPr>
-              <a:t>logging.INFO</a:t>
-            </a:r>
-            <a:r>
-              <a:rPr lang="en-GB" sz="2400" dirty="0">
-                <a:latin typeface="Courier New" panose="02070309020205020404" pitchFamily="49" charset="0"/>
-                <a:cs typeface="Courier New" panose="02070309020205020404" pitchFamily="49" charset="0"/>
-              </a:rPr>
-              <a:t>)</a:t>
-            </a:r>
-          </a:p>
-          <a:p>
-            <a:pPr eaLnBrk="1" fontAlgn="auto" hangingPunct="1">
-              <a:spcAft>
-                <a:spcPts val="0"/>
-              </a:spcAft>
-              <a:buFont typeface="Arial" panose="020B0604020202020204" pitchFamily="34" charset="0"/>
-              <a:buNone/>
-              <a:defRPr/>
-            </a:pPr>
-            <a:r>
-              <a:rPr lang="en-GB" sz="2400" b="1" dirty="0">
-                <a:latin typeface="Courier New" panose="02070309020205020404" pitchFamily="49" charset="0"/>
-                <a:cs typeface="Courier New" panose="02070309020205020404" pitchFamily="49" charset="0"/>
-              </a:rPr>
-              <a:t>&gt;&gt;&gt;</a:t>
-            </a:r>
-            <a:r>
-              <a:rPr lang="en-GB" sz="2400" dirty="0">
-                <a:latin typeface="Courier New" panose="02070309020205020404" pitchFamily="49" charset="0"/>
-                <a:cs typeface="Courier New" panose="02070309020205020404" pitchFamily="49" charset="0"/>
-              </a:rPr>
-              <a:t> log = </a:t>
-            </a:r>
-            <a:r>
-              <a:rPr lang="en-GB" sz="2400" dirty="0" err="1">
-                <a:latin typeface="Courier New" panose="02070309020205020404" pitchFamily="49" charset="0"/>
-                <a:cs typeface="Courier New" panose="02070309020205020404" pitchFamily="49" charset="0"/>
-              </a:rPr>
-              <a:t>logging.getLogger</a:t>
-            </a:r>
-            <a:r>
-              <a:rPr lang="en-GB" sz="2400" dirty="0">
-                <a:latin typeface="Courier New" panose="02070309020205020404" pitchFamily="49" charset="0"/>
-                <a:cs typeface="Courier New" panose="02070309020205020404" pitchFamily="49" charset="0"/>
-              </a:rPr>
-              <a:t>(__name__)</a:t>
-            </a:r>
-          </a:p>
-          <a:p>
-            <a:pPr eaLnBrk="1" fontAlgn="auto" hangingPunct="1">
-              <a:spcAft>
-                <a:spcPts val="0"/>
-              </a:spcAft>
-              <a:buFont typeface="Arial" panose="020B0604020202020204" pitchFamily="34" charset="0"/>
-              <a:buNone/>
-              <a:defRPr/>
-            </a:pPr>
-            <a:r>
-              <a:rPr lang="en-GB" sz="2400" b="1" dirty="0">
-                <a:latin typeface="Courier New" panose="02070309020205020404" pitchFamily="49" charset="0"/>
-                <a:cs typeface="Courier New" panose="02070309020205020404" pitchFamily="49" charset="0"/>
-              </a:rPr>
-              <a:t>&gt;&gt;&gt;</a:t>
-            </a:r>
-            <a:r>
-              <a:rPr lang="en-GB" sz="2400" dirty="0">
-                <a:latin typeface="Courier New" panose="02070309020205020404" pitchFamily="49" charset="0"/>
-                <a:cs typeface="Courier New" panose="02070309020205020404" pitchFamily="49" charset="0"/>
-              </a:rPr>
-              <a:t> log.info("The system is running")</a:t>
-            </a:r>
-          </a:p>
-          <a:p>
-            <a:pPr eaLnBrk="1" fontAlgn="auto" hangingPunct="1">
-              <a:spcAft>
-                <a:spcPts val="0"/>
-              </a:spcAft>
-              <a:buFont typeface="Arial" panose="020B0604020202020204" pitchFamily="34" charset="0"/>
-              <a:buNone/>
-              <a:defRPr/>
-            </a:pPr>
-            <a:r>
-              <a:rPr lang="en-GB" sz="2400" b="1" dirty="0" err="1">
-                <a:solidFill>
-                  <a:srgbClr val="FF0000"/>
-                </a:solidFill>
-                <a:latin typeface="Courier New" panose="02070309020205020404" pitchFamily="49" charset="0"/>
-                <a:cs typeface="Courier New" panose="02070309020205020404" pitchFamily="49" charset="0"/>
-              </a:rPr>
-              <a:t>INFO:root:The</a:t>
-            </a:r>
-            <a:r>
-              <a:rPr lang="en-GB" sz="2400" b="1" dirty="0">
-                <a:solidFill>
-                  <a:srgbClr val="FF0000"/>
-                </a:solidFill>
-                <a:latin typeface="Courier New" panose="02070309020205020404" pitchFamily="49" charset="0"/>
-                <a:cs typeface="Courier New" panose="02070309020205020404" pitchFamily="49" charset="0"/>
-              </a:rPr>
-              <a:t> system is running.</a:t>
-            </a:r>
-          </a:p>
-          <a:p>
-            <a:pPr eaLnBrk="1" fontAlgn="auto" hangingPunct="1">
-              <a:spcAft>
-                <a:spcPts val="0"/>
-              </a:spcAft>
-              <a:buFont typeface="Arial" panose="020B0604020202020204" pitchFamily="34" charset="0"/>
-              <a:buNone/>
-              <a:defRPr/>
-            </a:pPr>
-            <a:endParaRPr lang="en-GB" sz="2400" b="1" dirty="0">
-              <a:solidFill>
-                <a:srgbClr val="002060"/>
-              </a:solidFill>
-              <a:latin typeface="Courier New" panose="02070309020205020404" pitchFamily="49" charset="0"/>
-              <a:cs typeface="Courier New" panose="02070309020205020404" pitchFamily="49" charset="0"/>
-            </a:endParaRPr>
-          </a:p>
-          <a:p>
-            <a:pPr marL="4029075" indent="-4029075" eaLnBrk="1" fontAlgn="auto" hangingPunct="1">
-              <a:spcAft>
-                <a:spcPts val="0"/>
-              </a:spcAft>
-              <a:buFont typeface="Arial" panose="020B0604020202020204" pitchFamily="34" charset="0"/>
-              <a:buNone/>
-              <a:defRPr/>
-            </a:pPr>
-            <a:r>
-              <a:rPr lang="en-GB" sz="2400" b="1" dirty="0">
-                <a:latin typeface="Courier New" panose="02070309020205020404" pitchFamily="49" charset="0"/>
-                <a:cs typeface="Courier New" panose="02070309020205020404" pitchFamily="49" charset="0"/>
-              </a:rPr>
-              <a:t>&gt;&gt;&gt;</a:t>
-            </a:r>
-            <a:r>
-              <a:rPr lang="en-GB" sz="2400" dirty="0">
-                <a:latin typeface="Courier New" panose="02070309020205020404" pitchFamily="49" charset="0"/>
-                <a:cs typeface="Courier New" panose="02070309020205020404" pitchFamily="49" charset="0"/>
-              </a:rPr>
-              <a:t> </a:t>
-            </a:r>
-            <a:r>
-              <a:rPr lang="en-GB" sz="2400" dirty="0" err="1">
-                <a:latin typeface="Courier New" panose="02070309020205020404" pitchFamily="49" charset="0"/>
-                <a:cs typeface="Courier New" panose="02070309020205020404" pitchFamily="49" charset="0"/>
-              </a:rPr>
-              <a:t>log.debug</a:t>
-            </a:r>
-            <a:r>
-              <a:rPr lang="en-GB" sz="2400" dirty="0">
-                <a:latin typeface="Courier New" panose="02070309020205020404" pitchFamily="49" charset="0"/>
-                <a:cs typeface="Courier New" panose="02070309020205020404" pitchFamily="49" charset="0"/>
-              </a:rPr>
-              <a:t>("Nothing said") </a:t>
-            </a:r>
-            <a:r>
-              <a:rPr lang="en-GB" sz="2400" dirty="0">
-                <a:solidFill>
-                  <a:srgbClr val="FFC000"/>
-                </a:solidFill>
-                <a:latin typeface="Courier New" panose="02070309020205020404" pitchFamily="49" charset="0"/>
-                <a:cs typeface="Courier New" panose="02070309020205020404" pitchFamily="49" charset="0"/>
-              </a:rPr>
-              <a:t># Not displayed </a:t>
-            </a:r>
-          </a:p>
-          <a:p>
-            <a:pPr marL="4029075" indent="-4029075" eaLnBrk="1" fontAlgn="auto" hangingPunct="1">
-              <a:spcAft>
-                <a:spcPts val="0"/>
-              </a:spcAft>
-              <a:buFont typeface="Arial" panose="020B0604020202020204" pitchFamily="34" charset="0"/>
-              <a:buNone/>
-              <a:defRPr/>
-            </a:pPr>
-            <a:r>
-              <a:rPr lang="en-GB" sz="2400" dirty="0">
-                <a:solidFill>
-                  <a:srgbClr val="FFC000"/>
-                </a:solidFill>
-                <a:latin typeface="Courier New" panose="02070309020205020404" pitchFamily="49" charset="0"/>
-                <a:cs typeface="Courier New" panose="02070309020205020404" pitchFamily="49" charset="0"/>
-              </a:rPr>
-              <a:t>           because logging at lower than</a:t>
-            </a:r>
-          </a:p>
-          <a:p>
-            <a:pPr marL="4029075" indent="-4029075" eaLnBrk="1" fontAlgn="auto" hangingPunct="1">
-              <a:spcAft>
-                <a:spcPts val="0"/>
-              </a:spcAft>
-              <a:buFont typeface="Arial" panose="020B0604020202020204" pitchFamily="34" charset="0"/>
-              <a:buNone/>
-              <a:defRPr/>
-            </a:pPr>
-            <a:r>
-              <a:rPr lang="en-GB" sz="2400" dirty="0">
-                <a:solidFill>
-                  <a:srgbClr val="FFC000"/>
-                </a:solidFill>
-                <a:latin typeface="Courier New" panose="02070309020205020404" pitchFamily="49" charset="0"/>
-                <a:cs typeface="Courier New" panose="02070309020205020404" pitchFamily="49" charset="0"/>
-              </a:rPr>
-              <a:t>           priority level</a:t>
-            </a:r>
-          </a:p>
-          <a:p>
-            <a:pPr marL="4029075" indent="-4029075" eaLnBrk="1" fontAlgn="auto" hangingPunct="1">
-              <a:spcAft>
-                <a:spcPts val="0"/>
-              </a:spcAft>
-              <a:buFont typeface="Arial" panose="020B0604020202020204" pitchFamily="34" charset="0"/>
-              <a:buNone/>
-              <a:defRPr/>
-            </a:pPr>
-            <a:r>
-              <a:rPr lang="en-GB" sz="2400" b="1" dirty="0">
-                <a:latin typeface="Courier New" panose="02070309020205020404" pitchFamily="49" charset="0"/>
-                <a:cs typeface="Courier New" panose="02070309020205020404" pitchFamily="49" charset="0"/>
-              </a:rPr>
-              <a:t>&gt;&gt;&gt;</a:t>
-            </a:r>
-            <a:r>
-              <a:rPr lang="en-GB" sz="2400" dirty="0">
-                <a:latin typeface="Courier New" panose="02070309020205020404" pitchFamily="49" charset="0"/>
-                <a:cs typeface="Courier New" panose="02070309020205020404" pitchFamily="49" charset="0"/>
-              </a:rPr>
-              <a:t> </a:t>
-            </a:r>
-            <a:r>
-              <a:rPr lang="en-GB" sz="2400" dirty="0" err="1">
-                <a:latin typeface="Courier New" panose="02070309020205020404" pitchFamily="49" charset="0"/>
-                <a:cs typeface="Courier New" panose="02070309020205020404" pitchFamily="49" charset="0"/>
-              </a:rPr>
-              <a:t>log.error</a:t>
-            </a:r>
-            <a:r>
-              <a:rPr lang="en-GB" sz="2400" dirty="0">
-                <a:latin typeface="Courier New" panose="02070309020205020404" pitchFamily="49" charset="0"/>
-                <a:cs typeface="Courier New" panose="02070309020205020404" pitchFamily="49" charset="0"/>
-              </a:rPr>
-              <a:t>("Now it's serious!")</a:t>
-            </a:r>
-            <a:endParaRPr lang="en-GB" sz="2400" b="1" dirty="0">
-              <a:solidFill>
-                <a:srgbClr val="00B050"/>
-              </a:solidFill>
-              <a:latin typeface="Courier New" panose="02070309020205020404" pitchFamily="49" charset="0"/>
-              <a:cs typeface="Courier New" panose="02070309020205020404" pitchFamily="49" charset="0"/>
-            </a:endParaRPr>
-          </a:p>
-          <a:p>
-            <a:pPr marL="4029075" indent="-4029075" eaLnBrk="1" fontAlgn="auto" hangingPunct="1">
-              <a:spcAft>
-                <a:spcPts val="0"/>
-              </a:spcAft>
-              <a:buFont typeface="Arial" panose="020B0604020202020204" pitchFamily="34" charset="0"/>
-              <a:buNone/>
-              <a:defRPr/>
-            </a:pPr>
-            <a:r>
-              <a:rPr lang="en-GB" sz="2400" b="1" dirty="0">
-                <a:solidFill>
-                  <a:srgbClr val="FF0000"/>
-                </a:solidFill>
-                <a:latin typeface="Courier New" panose="02070309020205020404" pitchFamily="49" charset="0"/>
-                <a:cs typeface="Courier New" panose="02070309020205020404" pitchFamily="49" charset="0"/>
-              </a:rPr>
-              <a:t>ERROR:&lt;</a:t>
-            </a:r>
-            <a:r>
-              <a:rPr lang="en-GB" sz="2400" b="1" dirty="0" err="1">
-                <a:solidFill>
-                  <a:srgbClr val="FF0000"/>
-                </a:solidFill>
-                <a:latin typeface="Courier New" panose="02070309020205020404" pitchFamily="49" charset="0"/>
-                <a:cs typeface="Courier New" panose="02070309020205020404" pitchFamily="49" charset="0"/>
-              </a:rPr>
-              <a:t>module_name</a:t>
-            </a:r>
-            <a:r>
-              <a:rPr lang="en-GB" sz="2400" b="1" dirty="0">
-                <a:solidFill>
-                  <a:srgbClr val="FF0000"/>
-                </a:solidFill>
-                <a:latin typeface="Courier New" panose="02070309020205020404" pitchFamily="49" charset="0"/>
-                <a:cs typeface="Courier New" panose="02070309020205020404" pitchFamily="49" charset="0"/>
-              </a:rPr>
-              <a:t>&gt;:Now it's serious!</a:t>
-            </a:r>
-          </a:p>
-        </p:txBody>
-      </p:sp>
-    </p:spTree>
-  </p:cSld>
-  <p:clrMapOvr>
-    <a:masterClrMapping/>
-  </p:clrMapOvr>
-  <p:timing>
-    <p:tnLst>
-      <p:par>
-        <p:cTn id="1" dur="indefinite" restart="never" nodeType="tmRoot">
-          <p:childTnLst>
-            <p:seq concurrent="1" nextAc="seek">
-              <p:cTn id="2" dur="indefinite" nodeType="mainSeq">
-                <p:childTnLst>
-                  <p:par>
-                    <p:cTn id="3" fill="hold" nodeType="clickPar">
-                      <p:stCondLst>
-                        <p:cond delay="indefinite"/>
-                      </p:stCondLst>
-                      <p:childTnLst>
-                        <p:par>
-                          <p:cTn id="4" fill="hold" nodeType="withGroup">
-                            <p:stCondLst>
-                              <p:cond delay="0"/>
-                            </p:stCondLst>
-                            <p:childTnLst>
-                              <p:par>
-                                <p:cTn id="5" presetID="1" presetClass="entr" presetSubtype="0" fill="hold" nodeType="clickEffect">
-                                  <p:stCondLst>
-                                    <p:cond delay="0"/>
-                                  </p:stCondLst>
-                                  <p:childTnLst>
-                                    <p:set>
-                                      <p:cBhvr>
-                                        <p:cTn id="6" dur="1" fill="hold">
-                                          <p:stCondLst>
-                                            <p:cond delay="0"/>
-                                          </p:stCondLst>
-                                        </p:cTn>
-                                        <p:tgtEl>
-                                          <p:spTgt spid="3">
-                                            <p:txEl>
-                                              <p:pRg st="6" end="6"/>
-                                            </p:txEl>
-                                          </p:spTgt>
-                                        </p:tgtEl>
-                                        <p:attrNameLst>
-                                          <p:attrName>style.visibility</p:attrName>
-                                        </p:attrNameLst>
-                                      </p:cBhvr>
-                                      <p:to>
-                                        <p:strVal val="visible"/>
-                                      </p:to>
-                                    </p:set>
-                                  </p:childTnLst>
-                                </p:cTn>
-                              </p:par>
-                              <p:par>
-                                <p:cTn id="7" presetID="1" presetClass="entr" presetSubtype="0" fill="hold" nodeType="withEffect">
-                                  <p:stCondLst>
-                                    <p:cond delay="0"/>
-                                  </p:stCondLst>
-                                  <p:childTnLst>
-                                    <p:set>
-                                      <p:cBhvr>
-                                        <p:cTn id="8" dur="1" fill="hold">
-                                          <p:stCondLst>
-                                            <p:cond delay="0"/>
-                                          </p:stCondLst>
-                                        </p:cTn>
-                                        <p:tgtEl>
-                                          <p:spTgt spid="3">
-                                            <p:txEl>
-                                              <p:pRg st="7" end="7"/>
-                                            </p:txEl>
-                                          </p:spTgt>
-                                        </p:tgtEl>
-                                        <p:attrNameLst>
-                                          <p:attrName>style.visibility</p:attrName>
-                                        </p:attrNameLst>
-                                      </p:cBhvr>
-                                      <p:to>
-                                        <p:strVal val="visible"/>
-                                      </p:to>
-                                    </p:set>
-                                  </p:childTnLst>
-                                </p:cTn>
-                              </p:par>
-                              <p:par>
-                                <p:cTn id="9" presetID="1" presetClass="entr" presetSubtype="0" fill="hold" nodeType="withEffect">
-                                  <p:stCondLst>
-                                    <p:cond delay="0"/>
-                                  </p:stCondLst>
-                                  <p:childTnLst>
-                                    <p:set>
-                                      <p:cBhvr>
-                                        <p:cTn id="10" dur="1" fill="hold">
-                                          <p:stCondLst>
-                                            <p:cond delay="0"/>
-                                          </p:stCondLst>
-                                        </p:cTn>
-                                        <p:tgtEl>
-                                          <p:spTgt spid="3">
-                                            <p:txEl>
-                                              <p:pRg st="8" end="8"/>
-                                            </p:txEl>
-                                          </p:spTgt>
-                                        </p:tgtEl>
-                                        <p:attrNameLst>
-                                          <p:attrName>style.visibility</p:attrName>
-                                        </p:attrNameLst>
-                                      </p:cBhvr>
-                                      <p:to>
-                                        <p:strVal val="visible"/>
-                                      </p:to>
-                                    </p:set>
-                                  </p:childTnLst>
-                                </p:cTn>
-                              </p:par>
-                            </p:childTnLst>
-                          </p:cTn>
-                        </p:par>
-                      </p:childTnLst>
-                    </p:cTn>
-                  </p:par>
-                  <p:par>
-                    <p:cTn id="11" fill="hold" nodeType="clickPar">
-                      <p:stCondLst>
-                        <p:cond delay="indefinite"/>
-                      </p:stCondLst>
-                      <p:childTnLst>
-                        <p:par>
-                          <p:cTn id="12" fill="hold" nodeType="withGroup">
-                            <p:stCondLst>
-                              <p:cond delay="0"/>
-                            </p:stCondLst>
-                            <p:childTnLst>
-                              <p:par>
-                                <p:cTn id="13" presetID="1" presetClass="entr" presetSubtype="0" fill="hold" nodeType="clickEffect">
-                                  <p:stCondLst>
-                                    <p:cond delay="0"/>
-                                  </p:stCondLst>
-                                  <p:childTnLst>
-                                    <p:set>
-                                      <p:cBhvr>
-                                        <p:cTn id="14" dur="1" fill="hold">
-                                          <p:stCondLst>
-                                            <p:cond delay="0"/>
-                                          </p:stCondLst>
-                                        </p:cTn>
-                                        <p:tgtEl>
-                                          <p:spTgt spid="3">
-                                            <p:txEl>
-                                              <p:pRg st="9" end="9"/>
-                                            </p:txEl>
-                                          </p:spTgt>
-                                        </p:tgtEl>
-                                        <p:attrNameLst>
-                                          <p:attrName>style.visibility</p:attrName>
-                                        </p:attrNameLst>
-                                      </p:cBhvr>
-                                      <p:to>
-                                        <p:strVal val="visible"/>
-                                      </p:to>
-                                    </p:set>
-                                  </p:childTnLst>
-                                </p:cTn>
-                              </p:par>
-                              <p:par>
-                                <p:cTn id="15" presetID="1" presetClass="entr" presetSubtype="0" fill="hold" nodeType="withEffect">
-                                  <p:stCondLst>
-                                    <p:cond delay="0"/>
-                                  </p:stCondLst>
-                                  <p:childTnLst>
-                                    <p:set>
-                                      <p:cBhvr>
-                                        <p:cTn id="16" dur="1" fill="hold">
-                                          <p:stCondLst>
-                                            <p:cond delay="0"/>
-                                          </p:stCondLst>
-                                        </p:cTn>
-                                        <p:tgtEl>
-                                          <p:spTgt spid="3">
-                                            <p:txEl>
-                                              <p:pRg st="10" end="10"/>
                                             </p:txEl>
                                           </p:spTgt>
                                         </p:tgtEl>

</xml_diff>

<commit_message>
adding link to pdb commands
</commit_message>
<xml_diff>
--- a/python/presentations/learning_python/13_ceda-log-pdb.pptx
+++ b/python/presentations/learning_python/13_ceda-log-pdb.pptx
@@ -3251,6 +3251,47 @@
                 <a:cs typeface="Courier New" panose="02070309020205020404" pitchFamily="49" charset="0"/>
               </a:rPr>
               <a:t>'&gt;</a:t>
+            </a:r>
+          </a:p>
+        </p:txBody>
+      </p:sp>
+      <p:sp>
+        <p:nvSpPr>
+          <p:cNvPr id="2" name="TextBox 1">
+            <a:extLst>
+              <a:ext uri="{FF2B5EF4-FFF2-40B4-BE49-F238E27FC236}">
+                <a16:creationId xmlns:a16="http://schemas.microsoft.com/office/drawing/2014/main" id="{7EFB82BC-504B-0A40-A10A-9BE935CB9823}"/>
+              </a:ext>
+            </a:extLst>
+          </p:cNvPr>
+          <p:cNvSpPr txBox="1"/>
+          <p:nvPr/>
+        </p:nvSpPr>
+        <p:spPr>
+          <a:xfrm>
+            <a:off x="1475656" y="5726113"/>
+            <a:ext cx="6660798" cy="369332"/>
+          </a:xfrm>
+          <a:prstGeom prst="rect">
+            <a:avLst/>
+          </a:prstGeom>
+          <a:noFill/>
+        </p:spPr>
+        <p:txBody>
+          <a:bodyPr wrap="none" rtlCol="0">
+            <a:spAutoFit/>
+          </a:bodyPr>
+          <a:lstStyle/>
+          <a:p>
+            <a:r>
+              <a:rPr lang="en-GB" dirty="0">
+                <a:hlinkClick r:id="rId2"/>
+              </a:rPr>
+              <a:t>https://docs.python.org/3/library/pdb.html#debugger-commands</a:t>
+            </a:r>
+            <a:r>
+              <a:rPr lang="en-GB" dirty="0"/>
+              <a:t> </a:t>
             </a:r>
           </a:p>
         </p:txBody>

</xml_diff>